<commit_message>
updates to module 1
</commit_message>
<xml_diff>
--- a/overview-chart.pptx
+++ b/overview-chart.pptx
@@ -7,25 +7,26 @@
     <p:sldMasterId id="2147483651" r:id="rId3"/>
   </p:sldMasterIdLst>
   <p:notesMasterIdLst>
-    <p:notesMasterId r:id="rId7"/>
+    <p:notesMasterId r:id="rId8"/>
   </p:notesMasterIdLst>
   <p:handoutMasterIdLst>
-    <p:handoutMasterId r:id="rId8"/>
+    <p:handoutMasterId r:id="rId9"/>
   </p:handoutMasterIdLst>
   <p:sldIdLst>
     <p:sldId id="330" r:id="rId4"/>
     <p:sldId id="334" r:id="rId5"/>
-    <p:sldId id="333" r:id="rId6"/>
+    <p:sldId id="327" r:id="rId6"/>
+    <p:sldId id="333" r:id="rId7"/>
   </p:sldIdLst>
   <p:sldSz cx="12192000" cy="6858000"/>
   <p:notesSz cx="6858000" cy="9144000"/>
   <p:embeddedFontLst>
     <p:embeddedFont>
       <p:font typeface="Calibri" panose="020F0502020204030204" pitchFamily="34" charset="0"/>
-      <p:regular r:id="rId9"/>
-      <p:bold r:id="rId10"/>
-      <p:italic r:id="rId11"/>
-      <p:boldItalic r:id="rId12"/>
+      <p:regular r:id="rId10"/>
+      <p:bold r:id="rId11"/>
+      <p:italic r:id="rId12"/>
+      <p:boldItalic r:id="rId13"/>
     </p:embeddedFont>
   </p:embeddedFontLst>
   <p:defaultTextStyle>
@@ -239,7 +240,7 @@
           <a:p>
             <a:fld id="{9DAF894A-70DC-1344-8793-A2A3FB288CFE}" type="datetimeFigureOut">
               <a:rPr lang="en-US" smtClean="0"/>
-              <a:t>2/1/21</a:t>
+              <a:t>2/7/21</a:t>
             </a:fld>
             <a:endParaRPr lang="en-US"/>
           </a:p>
@@ -416,7 +417,7 @@
           <a:p>
             <a:fld id="{1FC4BE61-C03A-824C-A357-AB09725BFA9E}" type="datetimeFigureOut">
               <a:rPr lang="en-US" smtClean="0"/>
-              <a:t>2/1/21</a:t>
+              <a:t>2/7/21</a:t>
             </a:fld>
             <a:endParaRPr lang="en-US"/>
           </a:p>
@@ -844,29 +845,85 @@
           <a:bodyPr/>
           <a:lstStyle/>
           <a:p>
+            <a:pPr marL="0" marR="0" lvl="0" indent="0" algn="l" defTabSz="914400" rtl="0" eaLnBrk="1" fontAlgn="auto" latinLnBrk="0" hangingPunct="1">
+              <a:lnSpc>
+                <a:spcPct val="100000"/>
+              </a:lnSpc>
+              <a:spcBef>
+                <a:spcPts val="0"/>
+              </a:spcBef>
+              <a:spcAft>
+                <a:spcPts val="0"/>
+              </a:spcAft>
+              <a:buClrTx/>
+              <a:buSzTx/>
+              <a:buFontTx/>
+              <a:buNone/>
+              <a:tabLst/>
+              <a:defRPr/>
+            </a:pPr>
             <a:r>
               <a:rPr lang="en-US" dirty="0"/>
-              <a:t>Model selection flowchart</a:t>
-            </a:r>
-          </a:p>
-          <a:p>
-            <a:r>
-              <a:rPr lang="en-US" dirty="0"/>
-              <a:t>Nick: </a:t>
+              <a:t>A module focused on </a:t>
             </a:r>
             <a:r>
-              <a:rPr lang="en-US" dirty="0" err="1"/>
-              <a:t>flowchat</a:t>
+              <a:rPr lang="en-US" b="1" dirty="0"/>
+              <a:t>machine learning fundamentals</a:t>
             </a:r>
             <a:r>
               <a:rPr lang="en-US" dirty="0"/>
-              <a:t>; not mutual exclusive; classical models could be more accurate</a:t>
+              <a:t>, with </a:t>
             </a:r>
-          </a:p>
-          <a:p>
+            <a:r>
+              <a:rPr lang="en-US" b="1" dirty="0"/>
+              <a:t>applications to security</a:t>
+            </a:r>
             <a:r>
               <a:rPr lang="en-US" dirty="0"/>
-              <a:t>Model selection flowchart from other sources</a:t>
+              <a:t>. Introduction to the data science pipeline, and teach fundamental building blocks, from data ingestion and feature engineering to machine learning model selection. </a:t>
+            </a:r>
+          </a:p>
+          <a:p>
+            <a:pPr marL="0" marR="0" lvl="0" indent="0" algn="l" defTabSz="914400" rtl="0" eaLnBrk="1" fontAlgn="auto" latinLnBrk="0" hangingPunct="1">
+              <a:lnSpc>
+                <a:spcPct val="100000"/>
+              </a:lnSpc>
+              <a:spcBef>
+                <a:spcPts val="0"/>
+              </a:spcBef>
+              <a:spcAft>
+                <a:spcPts val="0"/>
+              </a:spcAft>
+              <a:buClrTx/>
+              <a:buSzTx/>
+              <a:buFontTx/>
+              <a:buNone/>
+              <a:tabLst/>
+              <a:defRPr/>
+            </a:pPr>
+            <a:endParaRPr lang="en-US" dirty="0"/>
+          </a:p>
+          <a:p>
+            <a:pPr marL="0" marR="0" lvl="0" indent="0" algn="l" defTabSz="914400" rtl="0" eaLnBrk="1" fontAlgn="auto" latinLnBrk="0" hangingPunct="1">
+              <a:lnSpc>
+                <a:spcPct val="100000"/>
+              </a:lnSpc>
+              <a:spcBef>
+                <a:spcPts val="0"/>
+              </a:spcBef>
+              <a:spcAft>
+                <a:spcPts val="0"/>
+              </a:spcAft>
+              <a:buClrTx/>
+              <a:buSzTx/>
+              <a:buFontTx/>
+              <a:buNone/>
+              <a:tabLst/>
+              <a:defRPr/>
+            </a:pPr>
+            <a:r>
+              <a:rPr lang="en-US" dirty="0"/>
+              <a:t>Modeling; Representation; Environment; Constraints (?)</a:t>
             </a:r>
           </a:p>
         </p:txBody>
@@ -889,6 +946,113 @@
             <a:fld id="{5707DA70-B503-1645-A111-858C3E791C84}" type="slidenum">
               <a:rPr lang="en-US" smtClean="0"/>
               <a:t>3</a:t>
+            </a:fld>
+            <a:endParaRPr lang="en-US"/>
+          </a:p>
+        </p:txBody>
+      </p:sp>
+    </p:spTree>
+    <p:extLst>
+      <p:ext uri="{BB962C8B-B14F-4D97-AF65-F5344CB8AC3E}">
+        <p14:creationId xmlns:p14="http://schemas.microsoft.com/office/powerpoint/2010/main" val="3749937646"/>
+      </p:ext>
+    </p:extLst>
+  </p:cSld>
+  <p:clrMapOvr>
+    <a:masterClrMapping/>
+  </p:clrMapOvr>
+</p:notes>
+</file>
+
+<file path=ppt/notesSlides/notesSlide3.xml><?xml version="1.0" encoding="utf-8"?>
+<p:notes xmlns:a="http://schemas.openxmlformats.org/drawingml/2006/main" xmlns:r="http://schemas.openxmlformats.org/officeDocument/2006/relationships" xmlns:p="http://schemas.openxmlformats.org/presentationml/2006/main">
+  <p:cSld>
+    <p:spTree>
+      <p:nvGrpSpPr>
+        <p:cNvPr id="1" name=""/>
+        <p:cNvGrpSpPr/>
+        <p:nvPr/>
+      </p:nvGrpSpPr>
+      <p:grpSpPr>
+        <a:xfrm>
+          <a:off x="0" y="0"/>
+          <a:ext cx="0" cy="0"/>
+          <a:chOff x="0" y="0"/>
+          <a:chExt cx="0" cy="0"/>
+        </a:xfrm>
+      </p:grpSpPr>
+      <p:sp>
+        <p:nvSpPr>
+          <p:cNvPr id="2" name="Slide Image Placeholder 1"/>
+          <p:cNvSpPr>
+            <a:spLocks noGrp="1" noRot="1" noChangeAspect="1"/>
+          </p:cNvSpPr>
+          <p:nvPr>
+            <p:ph type="sldImg"/>
+          </p:nvPr>
+        </p:nvSpPr>
+        <p:spPr/>
+      </p:sp>
+      <p:sp>
+        <p:nvSpPr>
+          <p:cNvPr id="3" name="Notes Placeholder 2"/>
+          <p:cNvSpPr>
+            <a:spLocks noGrp="1"/>
+          </p:cNvSpPr>
+          <p:nvPr>
+            <p:ph type="body" idx="1"/>
+          </p:nvPr>
+        </p:nvSpPr>
+        <p:spPr/>
+        <p:txBody>
+          <a:bodyPr/>
+          <a:lstStyle/>
+          <a:p>
+            <a:r>
+              <a:rPr lang="en-US" dirty="0"/>
+              <a:t>Model selection flowchart</a:t>
+            </a:r>
+          </a:p>
+          <a:p>
+            <a:r>
+              <a:rPr lang="en-US" dirty="0"/>
+              <a:t>Nick: </a:t>
+            </a:r>
+            <a:r>
+              <a:rPr lang="en-US" dirty="0" err="1"/>
+              <a:t>flowchat</a:t>
+            </a:r>
+            <a:r>
+              <a:rPr lang="en-US" dirty="0"/>
+              <a:t>; not mutual exclusive; classical models could be more accurate</a:t>
+            </a:r>
+          </a:p>
+          <a:p>
+            <a:r>
+              <a:rPr lang="en-US" dirty="0"/>
+              <a:t>Model selection flowchart from other sources</a:t>
+            </a:r>
+          </a:p>
+        </p:txBody>
+      </p:sp>
+      <p:sp>
+        <p:nvSpPr>
+          <p:cNvPr id="4" name="Slide Number Placeholder 3"/>
+          <p:cNvSpPr>
+            <a:spLocks noGrp="1"/>
+          </p:cNvSpPr>
+          <p:nvPr>
+            <p:ph type="sldNum" sz="quarter" idx="5"/>
+          </p:nvPr>
+        </p:nvSpPr>
+        <p:spPr/>
+        <p:txBody>
+          <a:bodyPr/>
+          <a:lstStyle/>
+          <a:p>
+            <a:fld id="{5707DA70-B503-1645-A111-858C3E791C84}" type="slidenum">
+              <a:rPr lang="en-US" smtClean="0"/>
+              <a:t>4</a:t>
             </a:fld>
             <a:endParaRPr lang="en-US"/>
           </a:p>
@@ -3993,6 +4157,16 @@
             <a:lstStyle/>
             <a:p>
               <a:pPr algn="ctr"/>
+              <a:endParaRPr lang="en-US" sz="1600" dirty="0">
+                <a:solidFill>
+                  <a:schemeClr val="bg2">
+                    <a:lumMod val="75000"/>
+                  </a:schemeClr>
+                </a:solidFill>
+              </a:endParaRPr>
+            </a:p>
+            <a:p>
+              <a:pPr algn="ctr"/>
               <a:r>
                 <a:rPr lang="en-US" sz="1600" dirty="0">
                   <a:solidFill>
@@ -4416,6 +4590,1211 @@
       </p:grpSpPr>
       <p:sp>
         <p:nvSpPr>
+          <p:cNvPr id="3" name="Title 2">
+            <a:extLst>
+              <a:ext uri="{FF2B5EF4-FFF2-40B4-BE49-F238E27FC236}">
+                <a16:creationId xmlns:a16="http://schemas.microsoft.com/office/drawing/2014/main" id="{46CF8940-0BF1-3C42-B43C-B740AFF4239A}"/>
+              </a:ext>
+            </a:extLst>
+          </p:cNvPr>
+          <p:cNvSpPr>
+            <a:spLocks noGrp="1"/>
+          </p:cNvSpPr>
+          <p:nvPr>
+            <p:ph type="title"/>
+          </p:nvPr>
+        </p:nvSpPr>
+        <p:spPr/>
+        <p:txBody>
+          <a:bodyPr/>
+          <a:lstStyle/>
+          <a:p>
+            <a:r>
+              <a:rPr lang="en-US" dirty="0"/>
+              <a:t>When Data Science Meets Cybersecurity</a:t>
+            </a:r>
+          </a:p>
+        </p:txBody>
+      </p:sp>
+      <p:grpSp>
+        <p:nvGrpSpPr>
+          <p:cNvPr id="19" name="Group 18">
+            <a:extLst>
+              <a:ext uri="{FF2B5EF4-FFF2-40B4-BE49-F238E27FC236}">
+                <a16:creationId xmlns:a16="http://schemas.microsoft.com/office/drawing/2014/main" id="{02F9FB7A-3BC2-534D-8330-D4D991DFDFB3}"/>
+              </a:ext>
+            </a:extLst>
+          </p:cNvPr>
+          <p:cNvGrpSpPr/>
+          <p:nvPr/>
+        </p:nvGrpSpPr>
+        <p:grpSpPr>
+          <a:xfrm>
+            <a:off x="398812" y="2152802"/>
+            <a:ext cx="2023614" cy="1833908"/>
+            <a:chOff x="2537459" y="1445872"/>
+            <a:chExt cx="2240281" cy="1332378"/>
+          </a:xfrm>
+        </p:grpSpPr>
+        <p:sp>
+          <p:nvSpPr>
+            <p:cNvPr id="20" name="Rectangle 19">
+              <a:extLst>
+                <a:ext uri="{FF2B5EF4-FFF2-40B4-BE49-F238E27FC236}">
+                  <a16:creationId xmlns:a16="http://schemas.microsoft.com/office/drawing/2014/main" id="{1167E967-47E3-4F4B-A160-0D3DE0D030C8}"/>
+                </a:ext>
+              </a:extLst>
+            </p:cNvPr>
+            <p:cNvSpPr/>
+            <p:nvPr/>
+          </p:nvSpPr>
+          <p:spPr>
+            <a:xfrm>
+              <a:off x="2537460" y="1445872"/>
+              <a:ext cx="2240280" cy="542949"/>
+            </a:xfrm>
+            <a:prstGeom prst="rect">
+              <a:avLst/>
+            </a:prstGeom>
+          </p:spPr>
+          <p:style>
+            <a:lnRef idx="2">
+              <a:schemeClr val="accent1">
+                <a:shade val="50000"/>
+              </a:schemeClr>
+            </a:lnRef>
+            <a:fillRef idx="1">
+              <a:schemeClr val="accent1"/>
+            </a:fillRef>
+            <a:effectRef idx="0">
+              <a:schemeClr val="accent1"/>
+            </a:effectRef>
+            <a:fontRef idx="minor">
+              <a:schemeClr val="lt1"/>
+            </a:fontRef>
+          </p:style>
+          <p:txBody>
+            <a:bodyPr rtlCol="0" anchor="ctr"/>
+            <a:lstStyle/>
+            <a:p>
+              <a:pPr algn="ctr"/>
+              <a:r>
+                <a:rPr lang="en-US" b="1" dirty="0"/>
+                <a:t>Data Collection</a:t>
+              </a:r>
+            </a:p>
+          </p:txBody>
+        </p:sp>
+        <p:sp>
+          <p:nvSpPr>
+            <p:cNvPr id="21" name="Rectangle 20">
+              <a:extLst>
+                <a:ext uri="{FF2B5EF4-FFF2-40B4-BE49-F238E27FC236}">
+                  <a16:creationId xmlns:a16="http://schemas.microsoft.com/office/drawing/2014/main" id="{69608ED0-9D95-194B-9573-C66D9DFAE3A7}"/>
+                </a:ext>
+              </a:extLst>
+            </p:cNvPr>
+            <p:cNvSpPr/>
+            <p:nvPr/>
+          </p:nvSpPr>
+          <p:spPr>
+            <a:xfrm>
+              <a:off x="2537459" y="1988820"/>
+              <a:ext cx="2240280" cy="789430"/>
+            </a:xfrm>
+            <a:prstGeom prst="rect">
+              <a:avLst/>
+            </a:prstGeom>
+            <a:solidFill>
+              <a:schemeClr val="bg1"/>
+            </a:solidFill>
+          </p:spPr>
+          <p:style>
+            <a:lnRef idx="2">
+              <a:schemeClr val="accent1">
+                <a:shade val="50000"/>
+              </a:schemeClr>
+            </a:lnRef>
+            <a:fillRef idx="1">
+              <a:schemeClr val="accent1"/>
+            </a:fillRef>
+            <a:effectRef idx="0">
+              <a:schemeClr val="accent1"/>
+            </a:effectRef>
+            <a:fontRef idx="minor">
+              <a:schemeClr val="lt1"/>
+            </a:fontRef>
+          </p:style>
+          <p:txBody>
+            <a:bodyPr rtlCol="0" anchor="ctr"/>
+            <a:lstStyle/>
+            <a:p>
+              <a:pPr algn="ctr"/>
+              <a:r>
+                <a:rPr lang="en-US" sz="1600" dirty="0">
+                  <a:solidFill>
+                    <a:schemeClr val="bg2">
+                      <a:lumMod val="75000"/>
+                    </a:schemeClr>
+                  </a:solidFill>
+                </a:rPr>
+                <a:t>Missing data</a:t>
+              </a:r>
+            </a:p>
+            <a:p>
+              <a:pPr algn="ctr"/>
+              <a:r>
+                <a:rPr lang="en-US" sz="1600" dirty="0">
+                  <a:solidFill>
+                    <a:schemeClr val="bg2">
+                      <a:lumMod val="75000"/>
+                    </a:schemeClr>
+                  </a:solidFill>
+                </a:rPr>
+                <a:t>Acquisition cost</a:t>
+              </a:r>
+            </a:p>
+            <a:p>
+              <a:pPr algn="ctr"/>
+              <a:r>
+                <a:rPr lang="en-US" sz="1600" dirty="0">
+                  <a:solidFill>
+                    <a:schemeClr val="bg2">
+                      <a:lumMod val="75000"/>
+                    </a:schemeClr>
+                  </a:solidFill>
+                </a:rPr>
+                <a:t>…</a:t>
+              </a:r>
+            </a:p>
+          </p:txBody>
+        </p:sp>
+      </p:grpSp>
+      <p:grpSp>
+        <p:nvGrpSpPr>
+          <p:cNvPr id="22" name="Group 21">
+            <a:extLst>
+              <a:ext uri="{FF2B5EF4-FFF2-40B4-BE49-F238E27FC236}">
+                <a16:creationId xmlns:a16="http://schemas.microsoft.com/office/drawing/2014/main" id="{CD6C8C76-A8D9-5941-8473-744D21E2D642}"/>
+              </a:ext>
+            </a:extLst>
+          </p:cNvPr>
+          <p:cNvGrpSpPr/>
+          <p:nvPr/>
+        </p:nvGrpSpPr>
+        <p:grpSpPr>
+          <a:xfrm>
+            <a:off x="3043979" y="2169709"/>
+            <a:ext cx="2183671" cy="1854377"/>
+            <a:chOff x="2537460" y="1431001"/>
+            <a:chExt cx="2240280" cy="1347250"/>
+          </a:xfrm>
+        </p:grpSpPr>
+        <p:sp>
+          <p:nvSpPr>
+            <p:cNvPr id="23" name="Rectangle 22">
+              <a:extLst>
+                <a:ext uri="{FF2B5EF4-FFF2-40B4-BE49-F238E27FC236}">
+                  <a16:creationId xmlns:a16="http://schemas.microsoft.com/office/drawing/2014/main" id="{CB1FDD5D-8653-D743-BF37-D0CBA23AD517}"/>
+                </a:ext>
+              </a:extLst>
+            </p:cNvPr>
+            <p:cNvSpPr/>
+            <p:nvPr/>
+          </p:nvSpPr>
+          <p:spPr>
+            <a:xfrm>
+              <a:off x="2537460" y="1431001"/>
+              <a:ext cx="2240280" cy="557819"/>
+            </a:xfrm>
+            <a:prstGeom prst="rect">
+              <a:avLst/>
+            </a:prstGeom>
+          </p:spPr>
+          <p:style>
+            <a:lnRef idx="2">
+              <a:schemeClr val="accent1">
+                <a:shade val="50000"/>
+              </a:schemeClr>
+            </a:lnRef>
+            <a:fillRef idx="1">
+              <a:schemeClr val="accent1"/>
+            </a:fillRef>
+            <a:effectRef idx="0">
+              <a:schemeClr val="accent1"/>
+            </a:effectRef>
+            <a:fontRef idx="minor">
+              <a:schemeClr val="lt1"/>
+            </a:fontRef>
+          </p:style>
+          <p:txBody>
+            <a:bodyPr rtlCol="0" anchor="ctr"/>
+            <a:lstStyle/>
+            <a:p>
+              <a:pPr algn="ctr"/>
+              <a:r>
+                <a:rPr lang="en-US" b="1" dirty="0"/>
+                <a:t>Data Representation</a:t>
+              </a:r>
+            </a:p>
+          </p:txBody>
+        </p:sp>
+        <p:sp>
+          <p:nvSpPr>
+            <p:cNvPr id="24" name="Rectangle 23">
+              <a:extLst>
+                <a:ext uri="{FF2B5EF4-FFF2-40B4-BE49-F238E27FC236}">
+                  <a16:creationId xmlns:a16="http://schemas.microsoft.com/office/drawing/2014/main" id="{CAF8320A-7356-6448-9973-2621BAC424A3}"/>
+                </a:ext>
+              </a:extLst>
+            </p:cNvPr>
+            <p:cNvSpPr/>
+            <p:nvPr/>
+          </p:nvSpPr>
+          <p:spPr>
+            <a:xfrm>
+              <a:off x="2537460" y="1988821"/>
+              <a:ext cx="2240280" cy="789430"/>
+            </a:xfrm>
+            <a:prstGeom prst="rect">
+              <a:avLst/>
+            </a:prstGeom>
+            <a:solidFill>
+              <a:schemeClr val="bg1"/>
+            </a:solidFill>
+          </p:spPr>
+          <p:style>
+            <a:lnRef idx="2">
+              <a:schemeClr val="accent1">
+                <a:shade val="50000"/>
+              </a:schemeClr>
+            </a:lnRef>
+            <a:fillRef idx="1">
+              <a:schemeClr val="accent1"/>
+            </a:fillRef>
+            <a:effectRef idx="0">
+              <a:schemeClr val="accent1"/>
+            </a:effectRef>
+            <a:fontRef idx="minor">
+              <a:schemeClr val="lt1"/>
+            </a:fontRef>
+          </p:style>
+          <p:txBody>
+            <a:bodyPr rtlCol="0" anchor="ctr"/>
+            <a:lstStyle/>
+            <a:p>
+              <a:pPr algn="ctr"/>
+              <a:r>
+                <a:rPr lang="en-US" sz="1600" dirty="0">
+                  <a:solidFill>
+                    <a:schemeClr val="bg2">
+                      <a:lumMod val="75000"/>
+                    </a:schemeClr>
+                  </a:solidFill>
+                </a:rPr>
+                <a:t>Interpretability; Fairness;</a:t>
+              </a:r>
+            </a:p>
+            <a:p>
+              <a:pPr algn="ctr"/>
+              <a:r>
+                <a:rPr lang="en-US" sz="1600" dirty="0">
+                  <a:solidFill>
+                    <a:schemeClr val="bg2">
+                      <a:lumMod val="75000"/>
+                    </a:schemeClr>
+                  </a:solidFill>
+                </a:rPr>
+                <a:t>Anonymization</a:t>
+              </a:r>
+            </a:p>
+          </p:txBody>
+        </p:sp>
+      </p:grpSp>
+      <p:grpSp>
+        <p:nvGrpSpPr>
+          <p:cNvPr id="25" name="Group 24">
+            <a:extLst>
+              <a:ext uri="{FF2B5EF4-FFF2-40B4-BE49-F238E27FC236}">
+                <a16:creationId xmlns:a16="http://schemas.microsoft.com/office/drawing/2014/main" id="{1C9F1B78-0C81-104D-B52D-DB6A0FD8453C}"/>
+              </a:ext>
+            </a:extLst>
+          </p:cNvPr>
+          <p:cNvGrpSpPr/>
+          <p:nvPr/>
+        </p:nvGrpSpPr>
+        <p:grpSpPr>
+          <a:xfrm>
+            <a:off x="5813140" y="2169710"/>
+            <a:ext cx="2379873" cy="1854376"/>
+            <a:chOff x="2537460" y="1431001"/>
+            <a:chExt cx="2240280" cy="1347250"/>
+          </a:xfrm>
+        </p:grpSpPr>
+        <p:sp>
+          <p:nvSpPr>
+            <p:cNvPr id="26" name="Rectangle 25">
+              <a:extLst>
+                <a:ext uri="{FF2B5EF4-FFF2-40B4-BE49-F238E27FC236}">
+                  <a16:creationId xmlns:a16="http://schemas.microsoft.com/office/drawing/2014/main" id="{7355A74D-D0BF-1644-95CC-85F1F54E13E8}"/>
+                </a:ext>
+              </a:extLst>
+            </p:cNvPr>
+            <p:cNvSpPr/>
+            <p:nvPr/>
+          </p:nvSpPr>
+          <p:spPr>
+            <a:xfrm>
+              <a:off x="2537460" y="1431001"/>
+              <a:ext cx="2240280" cy="557819"/>
+            </a:xfrm>
+            <a:prstGeom prst="rect">
+              <a:avLst/>
+            </a:prstGeom>
+          </p:spPr>
+          <p:style>
+            <a:lnRef idx="2">
+              <a:schemeClr val="accent1">
+                <a:shade val="50000"/>
+              </a:schemeClr>
+            </a:lnRef>
+            <a:fillRef idx="1">
+              <a:schemeClr val="accent1"/>
+            </a:fillRef>
+            <a:effectRef idx="0">
+              <a:schemeClr val="accent1"/>
+            </a:effectRef>
+            <a:fontRef idx="minor">
+              <a:schemeClr val="lt1"/>
+            </a:fontRef>
+          </p:style>
+          <p:txBody>
+            <a:bodyPr rtlCol="0" anchor="ctr"/>
+            <a:lstStyle/>
+            <a:p>
+              <a:pPr algn="ctr"/>
+              <a:r>
+                <a:rPr lang="en-US" b="1" dirty="0"/>
+                <a:t>Modeling</a:t>
+              </a:r>
+            </a:p>
+          </p:txBody>
+        </p:sp>
+        <p:sp>
+          <p:nvSpPr>
+            <p:cNvPr id="27" name="Rectangle 26">
+              <a:extLst>
+                <a:ext uri="{FF2B5EF4-FFF2-40B4-BE49-F238E27FC236}">
+                  <a16:creationId xmlns:a16="http://schemas.microsoft.com/office/drawing/2014/main" id="{895D29CC-01C3-4643-96B3-42E682A7D55A}"/>
+                </a:ext>
+              </a:extLst>
+            </p:cNvPr>
+            <p:cNvSpPr/>
+            <p:nvPr/>
+          </p:nvSpPr>
+          <p:spPr>
+            <a:xfrm>
+              <a:off x="2537460" y="1988821"/>
+              <a:ext cx="2240280" cy="789430"/>
+            </a:xfrm>
+            <a:prstGeom prst="rect">
+              <a:avLst/>
+            </a:prstGeom>
+            <a:solidFill>
+              <a:schemeClr val="bg1"/>
+            </a:solidFill>
+          </p:spPr>
+          <p:style>
+            <a:lnRef idx="2">
+              <a:schemeClr val="accent1">
+                <a:shade val="50000"/>
+              </a:schemeClr>
+            </a:lnRef>
+            <a:fillRef idx="1">
+              <a:schemeClr val="accent1"/>
+            </a:fillRef>
+            <a:effectRef idx="0">
+              <a:schemeClr val="accent1"/>
+            </a:effectRef>
+            <a:fontRef idx="minor">
+              <a:schemeClr val="lt1"/>
+            </a:fontRef>
+          </p:style>
+          <p:txBody>
+            <a:bodyPr rtlCol="0" anchor="ctr"/>
+            <a:lstStyle/>
+            <a:p>
+              <a:pPr algn="ctr"/>
+              <a:r>
+                <a:rPr lang="en-US" sz="1600" dirty="0">
+                  <a:solidFill>
+                    <a:schemeClr val="bg2">
+                      <a:lumMod val="75000"/>
+                    </a:schemeClr>
+                  </a:solidFill>
+                </a:rPr>
+                <a:t>Efficiency; Accuracy; Interpretability; Adversarial resistance;</a:t>
+              </a:r>
+            </a:p>
+            <a:p>
+              <a:pPr algn="ctr"/>
+              <a:r>
+                <a:rPr lang="en-US" sz="1600" dirty="0">
+                  <a:solidFill>
+                    <a:schemeClr val="bg2">
+                      <a:lumMod val="75000"/>
+                    </a:schemeClr>
+                  </a:solidFill>
+                </a:rPr>
+                <a:t>…</a:t>
+              </a:r>
+            </a:p>
+          </p:txBody>
+        </p:sp>
+      </p:grpSp>
+      <p:grpSp>
+        <p:nvGrpSpPr>
+          <p:cNvPr id="28" name="Group 27">
+            <a:extLst>
+              <a:ext uri="{FF2B5EF4-FFF2-40B4-BE49-F238E27FC236}">
+                <a16:creationId xmlns:a16="http://schemas.microsoft.com/office/drawing/2014/main" id="{C8682C49-164B-EF45-9AB8-0CC87262B6A4}"/>
+              </a:ext>
+            </a:extLst>
+          </p:cNvPr>
+          <p:cNvGrpSpPr/>
+          <p:nvPr/>
+        </p:nvGrpSpPr>
+        <p:grpSpPr>
+          <a:xfrm>
+            <a:off x="8814567" y="2152801"/>
+            <a:ext cx="2379873" cy="1833912"/>
+            <a:chOff x="2537460" y="1444323"/>
+            <a:chExt cx="2240280" cy="933120"/>
+          </a:xfrm>
+        </p:grpSpPr>
+        <p:sp>
+          <p:nvSpPr>
+            <p:cNvPr id="29" name="Rectangle 28">
+              <a:extLst>
+                <a:ext uri="{FF2B5EF4-FFF2-40B4-BE49-F238E27FC236}">
+                  <a16:creationId xmlns:a16="http://schemas.microsoft.com/office/drawing/2014/main" id="{67E86DE2-D770-0347-916D-DD0AC3062C46}"/>
+                </a:ext>
+              </a:extLst>
+            </p:cNvPr>
+            <p:cNvSpPr/>
+            <p:nvPr/>
+          </p:nvSpPr>
+          <p:spPr>
+            <a:xfrm>
+              <a:off x="2537460" y="1444323"/>
+              <a:ext cx="2240280" cy="390663"/>
+            </a:xfrm>
+            <a:prstGeom prst="rect">
+              <a:avLst/>
+            </a:prstGeom>
+          </p:spPr>
+          <p:style>
+            <a:lnRef idx="2">
+              <a:schemeClr val="accent1">
+                <a:shade val="50000"/>
+              </a:schemeClr>
+            </a:lnRef>
+            <a:fillRef idx="1">
+              <a:schemeClr val="accent1"/>
+            </a:fillRef>
+            <a:effectRef idx="0">
+              <a:schemeClr val="accent1"/>
+            </a:effectRef>
+            <a:fontRef idx="minor">
+              <a:schemeClr val="lt1"/>
+            </a:fontRef>
+          </p:style>
+          <p:txBody>
+            <a:bodyPr rtlCol="0" anchor="ctr"/>
+            <a:lstStyle/>
+            <a:p>
+              <a:pPr algn="ctr"/>
+              <a:r>
+                <a:rPr lang="en-US" b="1" dirty="0"/>
+                <a:t>Deployment</a:t>
+              </a:r>
+            </a:p>
+          </p:txBody>
+        </p:sp>
+        <p:sp>
+          <p:nvSpPr>
+            <p:cNvPr id="30" name="Rectangle 29">
+              <a:extLst>
+                <a:ext uri="{FF2B5EF4-FFF2-40B4-BE49-F238E27FC236}">
+                  <a16:creationId xmlns:a16="http://schemas.microsoft.com/office/drawing/2014/main" id="{D1E57660-43FC-8A44-8043-C10FB1545BC1}"/>
+                </a:ext>
+              </a:extLst>
+            </p:cNvPr>
+            <p:cNvSpPr/>
+            <p:nvPr/>
+          </p:nvSpPr>
+          <p:spPr>
+            <a:xfrm>
+              <a:off x="2537460" y="1834987"/>
+              <a:ext cx="2240280" cy="542456"/>
+            </a:xfrm>
+            <a:prstGeom prst="rect">
+              <a:avLst/>
+            </a:prstGeom>
+            <a:solidFill>
+              <a:schemeClr val="bg1"/>
+            </a:solidFill>
+          </p:spPr>
+          <p:style>
+            <a:lnRef idx="2">
+              <a:schemeClr val="accent1">
+                <a:shade val="50000"/>
+              </a:schemeClr>
+            </a:lnRef>
+            <a:fillRef idx="1">
+              <a:schemeClr val="accent1"/>
+            </a:fillRef>
+            <a:effectRef idx="0">
+              <a:schemeClr val="accent1"/>
+            </a:effectRef>
+            <a:fontRef idx="minor">
+              <a:schemeClr val="lt1"/>
+            </a:fontRef>
+          </p:style>
+          <p:txBody>
+            <a:bodyPr rtlCol="0" anchor="ctr"/>
+            <a:lstStyle/>
+            <a:p>
+              <a:pPr algn="ctr"/>
+              <a:r>
+                <a:rPr lang="en-US" sz="1600" dirty="0">
+                  <a:solidFill>
+                    <a:schemeClr val="bg2">
+                      <a:lumMod val="75000"/>
+                    </a:schemeClr>
+                  </a:solidFill>
+                </a:rPr>
+                <a:t>Ethics, Fairness, Responsibility, </a:t>
+              </a:r>
+            </a:p>
+            <a:p>
+              <a:pPr algn="ctr"/>
+              <a:r>
+                <a:rPr lang="en-US" sz="1600" dirty="0">
+                  <a:solidFill>
+                    <a:schemeClr val="bg2">
+                      <a:lumMod val="75000"/>
+                    </a:schemeClr>
+                  </a:solidFill>
+                </a:rPr>
+                <a:t>and Transparency</a:t>
+              </a:r>
+            </a:p>
+          </p:txBody>
+        </p:sp>
+      </p:grpSp>
+      <p:sp>
+        <p:nvSpPr>
+          <p:cNvPr id="31" name="Right Arrow 30">
+            <a:extLst>
+              <a:ext uri="{FF2B5EF4-FFF2-40B4-BE49-F238E27FC236}">
+                <a16:creationId xmlns:a16="http://schemas.microsoft.com/office/drawing/2014/main" id="{687043B9-15BB-644E-9165-FCDFD4C554A5}"/>
+              </a:ext>
+            </a:extLst>
+          </p:cNvPr>
+          <p:cNvSpPr/>
+          <p:nvPr/>
+        </p:nvSpPr>
+        <p:spPr>
+          <a:xfrm>
+            <a:off x="2574903" y="2900125"/>
+            <a:ext cx="323125" cy="196770"/>
+          </a:xfrm>
+          <a:prstGeom prst="rightArrow">
+            <a:avLst/>
+          </a:prstGeom>
+        </p:spPr>
+        <p:style>
+          <a:lnRef idx="2">
+            <a:schemeClr val="accent1">
+              <a:shade val="50000"/>
+            </a:schemeClr>
+          </a:lnRef>
+          <a:fillRef idx="1">
+            <a:schemeClr val="accent1"/>
+          </a:fillRef>
+          <a:effectRef idx="0">
+            <a:schemeClr val="accent1"/>
+          </a:effectRef>
+          <a:fontRef idx="minor">
+            <a:schemeClr val="lt1"/>
+          </a:fontRef>
+        </p:style>
+        <p:txBody>
+          <a:bodyPr rtlCol="0" anchor="ctr"/>
+          <a:lstStyle/>
+          <a:p>
+            <a:pPr algn="ctr"/>
+            <a:endParaRPr lang="en-US"/>
+          </a:p>
+        </p:txBody>
+      </p:sp>
+      <p:sp>
+        <p:nvSpPr>
+          <p:cNvPr id="32" name="Right Arrow 31">
+            <a:extLst>
+              <a:ext uri="{FF2B5EF4-FFF2-40B4-BE49-F238E27FC236}">
+                <a16:creationId xmlns:a16="http://schemas.microsoft.com/office/drawing/2014/main" id="{6E2AF713-7698-934E-BA9F-8E69AD3C6A01}"/>
+              </a:ext>
+            </a:extLst>
+          </p:cNvPr>
+          <p:cNvSpPr/>
+          <p:nvPr/>
+        </p:nvSpPr>
+        <p:spPr>
+          <a:xfrm>
+            <a:off x="5373601" y="2900122"/>
+            <a:ext cx="328928" cy="196773"/>
+          </a:xfrm>
+          <a:prstGeom prst="rightArrow">
+            <a:avLst/>
+          </a:prstGeom>
+        </p:spPr>
+        <p:style>
+          <a:lnRef idx="2">
+            <a:schemeClr val="accent1">
+              <a:shade val="50000"/>
+            </a:schemeClr>
+          </a:lnRef>
+          <a:fillRef idx="1">
+            <a:schemeClr val="accent1"/>
+          </a:fillRef>
+          <a:effectRef idx="0">
+            <a:schemeClr val="accent1"/>
+          </a:effectRef>
+          <a:fontRef idx="minor">
+            <a:schemeClr val="lt1"/>
+          </a:fontRef>
+        </p:style>
+        <p:txBody>
+          <a:bodyPr rtlCol="0" anchor="ctr"/>
+          <a:lstStyle/>
+          <a:p>
+            <a:pPr algn="ctr"/>
+            <a:endParaRPr lang="en-US"/>
+          </a:p>
+        </p:txBody>
+      </p:sp>
+      <p:sp>
+        <p:nvSpPr>
+          <p:cNvPr id="4" name="Bent-Up Arrow 3">
+            <a:extLst>
+              <a:ext uri="{FF2B5EF4-FFF2-40B4-BE49-F238E27FC236}">
+                <a16:creationId xmlns:a16="http://schemas.microsoft.com/office/drawing/2014/main" id="{28682DEA-3711-9F44-B2F0-6550FE62E21C}"/>
+              </a:ext>
+            </a:extLst>
+          </p:cNvPr>
+          <p:cNvSpPr/>
+          <p:nvPr/>
+        </p:nvSpPr>
+        <p:spPr>
+          <a:xfrm flipH="1">
+            <a:off x="1148374" y="4274500"/>
+            <a:ext cx="10205425" cy="902527"/>
+          </a:xfrm>
+          <a:prstGeom prst="bentUpArrow">
+            <a:avLst>
+              <a:gd name="adj1" fmla="val 16041"/>
+              <a:gd name="adj2" fmla="val 20207"/>
+              <a:gd name="adj3" fmla="val 25170"/>
+            </a:avLst>
+          </a:prstGeom>
+        </p:spPr>
+        <p:style>
+          <a:lnRef idx="2">
+            <a:schemeClr val="accent1">
+              <a:shade val="50000"/>
+            </a:schemeClr>
+          </a:lnRef>
+          <a:fillRef idx="1">
+            <a:schemeClr val="accent1"/>
+          </a:fillRef>
+          <a:effectRef idx="0">
+            <a:schemeClr val="accent1"/>
+          </a:effectRef>
+          <a:fontRef idx="minor">
+            <a:schemeClr val="lt1"/>
+          </a:fontRef>
+        </p:style>
+        <p:txBody>
+          <a:bodyPr rtlCol="0" anchor="ctr"/>
+          <a:lstStyle/>
+          <a:p>
+            <a:pPr algn="ctr"/>
+            <a:endParaRPr lang="en-US"/>
+          </a:p>
+        </p:txBody>
+      </p:sp>
+      <p:sp>
+        <p:nvSpPr>
+          <p:cNvPr id="42" name="Right Arrow 41">
+            <a:extLst>
+              <a:ext uri="{FF2B5EF4-FFF2-40B4-BE49-F238E27FC236}">
+                <a16:creationId xmlns:a16="http://schemas.microsoft.com/office/drawing/2014/main" id="{E59032F9-AEB3-194D-9B50-C5B0D0C27507}"/>
+              </a:ext>
+            </a:extLst>
+          </p:cNvPr>
+          <p:cNvSpPr/>
+          <p:nvPr/>
+        </p:nvSpPr>
+        <p:spPr>
+          <a:xfrm>
+            <a:off x="8339326" y="2903487"/>
+            <a:ext cx="328928" cy="196773"/>
+          </a:xfrm>
+          <a:prstGeom prst="rightArrow">
+            <a:avLst/>
+          </a:prstGeom>
+        </p:spPr>
+        <p:style>
+          <a:lnRef idx="2">
+            <a:schemeClr val="accent1">
+              <a:shade val="50000"/>
+            </a:schemeClr>
+          </a:lnRef>
+          <a:fillRef idx="1">
+            <a:schemeClr val="accent1"/>
+          </a:fillRef>
+          <a:effectRef idx="0">
+            <a:schemeClr val="accent1"/>
+          </a:effectRef>
+          <a:fontRef idx="minor">
+            <a:schemeClr val="lt1"/>
+          </a:fontRef>
+        </p:style>
+        <p:txBody>
+          <a:bodyPr rtlCol="0" anchor="ctr"/>
+          <a:lstStyle/>
+          <a:p>
+            <a:pPr algn="ctr"/>
+            <a:endParaRPr lang="en-US"/>
+          </a:p>
+        </p:txBody>
+      </p:sp>
+      <p:sp>
+        <p:nvSpPr>
+          <p:cNvPr id="46" name="U-Turn Arrow 45">
+            <a:extLst>
+              <a:ext uri="{FF2B5EF4-FFF2-40B4-BE49-F238E27FC236}">
+                <a16:creationId xmlns:a16="http://schemas.microsoft.com/office/drawing/2014/main" id="{89B0BE2E-48D4-0241-8B00-E376230C5315}"/>
+              </a:ext>
+            </a:extLst>
+          </p:cNvPr>
+          <p:cNvSpPr/>
+          <p:nvPr/>
+        </p:nvSpPr>
+        <p:spPr>
+          <a:xfrm rot="5400000">
+            <a:off x="10382294" y="3870094"/>
+            <a:ext cx="2270714" cy="439390"/>
+          </a:xfrm>
+          <a:prstGeom prst="uturnArrow">
+            <a:avLst>
+              <a:gd name="adj1" fmla="val 28221"/>
+              <a:gd name="adj2" fmla="val 25000"/>
+              <a:gd name="adj3" fmla="val 25000"/>
+              <a:gd name="adj4" fmla="val 43750"/>
+              <a:gd name="adj5" fmla="val 75000"/>
+            </a:avLst>
+          </a:prstGeom>
+        </p:spPr>
+        <p:style>
+          <a:lnRef idx="2">
+            <a:schemeClr val="accent1">
+              <a:shade val="50000"/>
+            </a:schemeClr>
+          </a:lnRef>
+          <a:fillRef idx="1">
+            <a:schemeClr val="accent1"/>
+          </a:fillRef>
+          <a:effectRef idx="0">
+            <a:schemeClr val="accent1"/>
+          </a:effectRef>
+          <a:fontRef idx="minor">
+            <a:schemeClr val="lt1"/>
+          </a:fontRef>
+        </p:style>
+        <p:txBody>
+          <a:bodyPr rtlCol="0" anchor="ctr"/>
+          <a:lstStyle/>
+          <a:p>
+            <a:pPr algn="ctr"/>
+            <a:endParaRPr lang="en-US">
+              <a:solidFill>
+                <a:schemeClr val="tx1"/>
+              </a:solidFill>
+            </a:endParaRPr>
+          </a:p>
+        </p:txBody>
+      </p:sp>
+      <p:sp>
+        <p:nvSpPr>
+          <p:cNvPr id="2" name="Left Brace 1">
+            <a:extLst>
+              <a:ext uri="{FF2B5EF4-FFF2-40B4-BE49-F238E27FC236}">
+                <a16:creationId xmlns:a16="http://schemas.microsoft.com/office/drawing/2014/main" id="{E5AED0CF-06E6-A741-BB61-59565F7A4361}"/>
+              </a:ext>
+            </a:extLst>
+          </p:cNvPr>
+          <p:cNvSpPr/>
+          <p:nvPr/>
+        </p:nvSpPr>
+        <p:spPr>
+          <a:xfrm rot="5400000">
+            <a:off x="6837337" y="1085814"/>
+            <a:ext cx="294440" cy="1777115"/>
+          </a:xfrm>
+          <a:prstGeom prst="leftBrace">
+            <a:avLst>
+              <a:gd name="adj1" fmla="val 66327"/>
+              <a:gd name="adj2" fmla="val 52421"/>
+            </a:avLst>
+          </a:prstGeom>
+          <a:noFill/>
+          <a:ln w="47625">
+            <a:solidFill>
+              <a:srgbClr val="800000"/>
+            </a:solidFill>
+          </a:ln>
+        </p:spPr>
+        <p:style>
+          <a:lnRef idx="2">
+            <a:schemeClr val="accent3"/>
+          </a:lnRef>
+          <a:fillRef idx="0">
+            <a:schemeClr val="accent3"/>
+          </a:fillRef>
+          <a:effectRef idx="1">
+            <a:schemeClr val="accent3"/>
+          </a:effectRef>
+          <a:fontRef idx="minor">
+            <a:schemeClr val="tx1"/>
+          </a:fontRef>
+        </p:style>
+        <p:txBody>
+          <a:bodyPr rtlCol="0" anchor="ctr"/>
+          <a:lstStyle/>
+          <a:p>
+            <a:pPr algn="ctr"/>
+            <a:endParaRPr lang="en-US">
+              <a:ln>
+                <a:solidFill>
+                  <a:schemeClr val="accent1">
+                    <a:lumMod val="60000"/>
+                    <a:lumOff val="40000"/>
+                  </a:schemeClr>
+                </a:solidFill>
+              </a:ln>
+            </a:endParaRPr>
+          </a:p>
+        </p:txBody>
+      </p:sp>
+      <p:sp>
+        <p:nvSpPr>
+          <p:cNvPr id="5" name="TextBox 4">
+            <a:extLst>
+              <a:ext uri="{FF2B5EF4-FFF2-40B4-BE49-F238E27FC236}">
+                <a16:creationId xmlns:a16="http://schemas.microsoft.com/office/drawing/2014/main" id="{2FB07946-146B-5542-B4C9-211A1FF77CEA}"/>
+              </a:ext>
+            </a:extLst>
+          </p:cNvPr>
+          <p:cNvSpPr txBox="1"/>
+          <p:nvPr/>
+        </p:nvSpPr>
+        <p:spPr>
+          <a:xfrm>
+            <a:off x="6417735" y="1428684"/>
+            <a:ext cx="1133644" cy="369332"/>
+          </a:xfrm>
+          <a:prstGeom prst="rect">
+            <a:avLst/>
+          </a:prstGeom>
+          <a:noFill/>
+        </p:spPr>
+        <p:txBody>
+          <a:bodyPr wrap="none" rtlCol="0">
+            <a:spAutoFit/>
+          </a:bodyPr>
+          <a:lstStyle/>
+          <a:p>
+            <a:r>
+              <a:rPr lang="en-US" dirty="0"/>
+              <a:t>Module 1</a:t>
+            </a:r>
+          </a:p>
+        </p:txBody>
+      </p:sp>
+      <p:sp>
+        <p:nvSpPr>
+          <p:cNvPr id="33" name="TextBox 32">
+            <a:extLst>
+              <a:ext uri="{FF2B5EF4-FFF2-40B4-BE49-F238E27FC236}">
+                <a16:creationId xmlns:a16="http://schemas.microsoft.com/office/drawing/2014/main" id="{7B349268-6D52-3F4A-B9E9-5C3456882036}"/>
+              </a:ext>
+            </a:extLst>
+          </p:cNvPr>
+          <p:cNvSpPr txBox="1"/>
+          <p:nvPr/>
+        </p:nvSpPr>
+        <p:spPr>
+          <a:xfrm>
+            <a:off x="10214502" y="4463523"/>
+            <a:ext cx="1133644" cy="369332"/>
+          </a:xfrm>
+          <a:prstGeom prst="rect">
+            <a:avLst/>
+          </a:prstGeom>
+          <a:noFill/>
+        </p:spPr>
+        <p:txBody>
+          <a:bodyPr wrap="none" rtlCol="0">
+            <a:spAutoFit/>
+          </a:bodyPr>
+          <a:lstStyle/>
+          <a:p>
+            <a:r>
+              <a:rPr lang="en-US" dirty="0"/>
+              <a:t>Module 4</a:t>
+            </a:r>
+          </a:p>
+        </p:txBody>
+      </p:sp>
+      <p:sp>
+        <p:nvSpPr>
+          <p:cNvPr id="34" name="Left Brace 33">
+            <a:extLst>
+              <a:ext uri="{FF2B5EF4-FFF2-40B4-BE49-F238E27FC236}">
+                <a16:creationId xmlns:a16="http://schemas.microsoft.com/office/drawing/2014/main" id="{95277AF3-F10B-6F4F-A7CC-E7276D8BD2BD}"/>
+              </a:ext>
+            </a:extLst>
+          </p:cNvPr>
+          <p:cNvSpPr/>
+          <p:nvPr/>
+        </p:nvSpPr>
+        <p:spPr>
+          <a:xfrm rot="5400000">
+            <a:off x="2719571" y="-399496"/>
+            <a:ext cx="310567" cy="4705592"/>
+          </a:xfrm>
+          <a:prstGeom prst="leftBrace">
+            <a:avLst>
+              <a:gd name="adj1" fmla="val 66327"/>
+              <a:gd name="adj2" fmla="val 52421"/>
+            </a:avLst>
+          </a:prstGeom>
+          <a:noFill/>
+          <a:ln w="47625">
+            <a:solidFill>
+              <a:srgbClr val="800000"/>
+            </a:solidFill>
+          </a:ln>
+        </p:spPr>
+        <p:style>
+          <a:lnRef idx="2">
+            <a:schemeClr val="accent3"/>
+          </a:lnRef>
+          <a:fillRef idx="0">
+            <a:schemeClr val="accent3"/>
+          </a:fillRef>
+          <a:effectRef idx="1">
+            <a:schemeClr val="accent3"/>
+          </a:effectRef>
+          <a:fontRef idx="minor">
+            <a:schemeClr val="tx1"/>
+          </a:fontRef>
+        </p:style>
+        <p:txBody>
+          <a:bodyPr rtlCol="0" anchor="ctr"/>
+          <a:lstStyle/>
+          <a:p>
+            <a:pPr algn="ctr"/>
+            <a:endParaRPr lang="en-US">
+              <a:ln>
+                <a:solidFill>
+                  <a:schemeClr val="accent1">
+                    <a:lumMod val="60000"/>
+                    <a:lumOff val="40000"/>
+                  </a:schemeClr>
+                </a:solidFill>
+              </a:ln>
+            </a:endParaRPr>
+          </a:p>
+        </p:txBody>
+      </p:sp>
+      <p:sp>
+        <p:nvSpPr>
+          <p:cNvPr id="35" name="Left Brace 34">
+            <a:extLst>
+              <a:ext uri="{FF2B5EF4-FFF2-40B4-BE49-F238E27FC236}">
+                <a16:creationId xmlns:a16="http://schemas.microsoft.com/office/drawing/2014/main" id="{71336F3B-61B1-244F-8DBB-B8198997DB34}"/>
+              </a:ext>
+            </a:extLst>
+          </p:cNvPr>
+          <p:cNvSpPr/>
+          <p:nvPr/>
+        </p:nvSpPr>
+        <p:spPr>
+          <a:xfrm rot="5400000" flipH="1">
+            <a:off x="5374836" y="1927986"/>
+            <a:ext cx="381986" cy="4705592"/>
+          </a:xfrm>
+          <a:prstGeom prst="leftBrace">
+            <a:avLst>
+              <a:gd name="adj1" fmla="val 66327"/>
+              <a:gd name="adj2" fmla="val 52421"/>
+            </a:avLst>
+          </a:prstGeom>
+          <a:noFill/>
+          <a:ln w="47625">
+            <a:solidFill>
+              <a:srgbClr val="800000"/>
+            </a:solidFill>
+          </a:ln>
+        </p:spPr>
+        <p:style>
+          <a:lnRef idx="2">
+            <a:schemeClr val="accent3"/>
+          </a:lnRef>
+          <a:fillRef idx="0">
+            <a:schemeClr val="accent3"/>
+          </a:fillRef>
+          <a:effectRef idx="1">
+            <a:schemeClr val="accent3"/>
+          </a:effectRef>
+          <a:fontRef idx="minor">
+            <a:schemeClr val="tx1"/>
+          </a:fontRef>
+        </p:style>
+        <p:txBody>
+          <a:bodyPr rtlCol="0" anchor="ctr"/>
+          <a:lstStyle/>
+          <a:p>
+            <a:pPr algn="ctr"/>
+            <a:endParaRPr lang="en-US">
+              <a:ln>
+                <a:solidFill>
+                  <a:schemeClr val="accent1">
+                    <a:lumMod val="60000"/>
+                    <a:lumOff val="40000"/>
+                  </a:schemeClr>
+                </a:solidFill>
+              </a:ln>
+            </a:endParaRPr>
+          </a:p>
+        </p:txBody>
+      </p:sp>
+      <p:sp>
+        <p:nvSpPr>
+          <p:cNvPr id="36" name="TextBox 35">
+            <a:extLst>
+              <a:ext uri="{FF2B5EF4-FFF2-40B4-BE49-F238E27FC236}">
+                <a16:creationId xmlns:a16="http://schemas.microsoft.com/office/drawing/2014/main" id="{A93D2CE0-C6B4-9042-8459-F8320BA142D3}"/>
+              </a:ext>
+            </a:extLst>
+          </p:cNvPr>
+          <p:cNvSpPr txBox="1"/>
+          <p:nvPr/>
+        </p:nvSpPr>
+        <p:spPr>
+          <a:xfrm>
+            <a:off x="2169643" y="1454521"/>
+            <a:ext cx="1133644" cy="369332"/>
+          </a:xfrm>
+          <a:prstGeom prst="rect">
+            <a:avLst/>
+          </a:prstGeom>
+          <a:noFill/>
+        </p:spPr>
+        <p:txBody>
+          <a:bodyPr wrap="none" rtlCol="0">
+            <a:spAutoFit/>
+          </a:bodyPr>
+          <a:lstStyle/>
+          <a:p>
+            <a:r>
+              <a:rPr lang="en-US" dirty="0"/>
+              <a:t>Module 2</a:t>
+            </a:r>
+          </a:p>
+        </p:txBody>
+      </p:sp>
+      <p:sp>
+        <p:nvSpPr>
+          <p:cNvPr id="37" name="TextBox 36">
+            <a:extLst>
+              <a:ext uri="{FF2B5EF4-FFF2-40B4-BE49-F238E27FC236}">
+                <a16:creationId xmlns:a16="http://schemas.microsoft.com/office/drawing/2014/main" id="{8EC02717-612C-3F45-9BC2-1E15CA0FCD9D}"/>
+              </a:ext>
+            </a:extLst>
+          </p:cNvPr>
+          <p:cNvSpPr txBox="1"/>
+          <p:nvPr/>
+        </p:nvSpPr>
+        <p:spPr>
+          <a:xfrm>
+            <a:off x="4903332" y="4486788"/>
+            <a:ext cx="1133644" cy="369332"/>
+          </a:xfrm>
+          <a:prstGeom prst="rect">
+            <a:avLst/>
+          </a:prstGeom>
+          <a:noFill/>
+        </p:spPr>
+        <p:txBody>
+          <a:bodyPr wrap="none" rtlCol="0">
+            <a:spAutoFit/>
+          </a:bodyPr>
+          <a:lstStyle/>
+          <a:p>
+            <a:r>
+              <a:rPr lang="en-US" dirty="0"/>
+              <a:t>Module 3</a:t>
+            </a:r>
+          </a:p>
+        </p:txBody>
+      </p:sp>
+    </p:spTree>
+    <p:extLst>
+      <p:ext uri="{BB962C8B-B14F-4D97-AF65-F5344CB8AC3E}">
+        <p14:creationId xmlns:p14="http://schemas.microsoft.com/office/powerpoint/2010/main" val="2023847327"/>
+      </p:ext>
+    </p:extLst>
+  </p:cSld>
+  <p:clrMapOvr>
+    <a:masterClrMapping/>
+  </p:clrMapOvr>
+</p:sld>
+</file>
+
+<file path=ppt/slides/slide4.xml><?xml version="1.0" encoding="utf-8"?>
+<p:sld xmlns:a="http://schemas.openxmlformats.org/drawingml/2006/main" xmlns:r="http://schemas.openxmlformats.org/officeDocument/2006/relationships" xmlns:p="http://schemas.openxmlformats.org/presentationml/2006/main">
+  <p:cSld>
+    <p:spTree>
+      <p:nvGrpSpPr>
+        <p:cNvPr id="1" name=""/>
+        <p:cNvGrpSpPr/>
+        <p:nvPr/>
+      </p:nvGrpSpPr>
+      <p:grpSpPr>
+        <a:xfrm>
+          <a:off x="0" y="0"/>
+          <a:ext cx="0" cy="0"/>
+          <a:chOff x="0" y="0"/>
+          <a:chExt cx="0" cy="0"/>
+        </a:xfrm>
+      </p:grpSpPr>
+      <p:sp>
+        <p:nvSpPr>
           <p:cNvPr id="5" name="Slide Number Placeholder 4">
             <a:extLst>
               <a:ext uri="{FF2B5EF4-FFF2-40B4-BE49-F238E27FC236}">
@@ -4438,7 +5817,7 @@
             <a:fld id="{256CE055-ECFD-9048-9FD8-7E2D8656A4F7}" type="slidenum">
               <a:rPr lang="en-US" smtClean="0"/>
               <a:pPr/>
-              <a:t>3</a:t>
+              <a:t>4</a:t>
             </a:fld>
             <a:endParaRPr lang="en-US" dirty="0"/>
           </a:p>

</xml_diff>